<commit_message>
applied some changes to natural disasters ppt
</commit_message>
<xml_diff>
--- a/NaturalDisasters.pptx
+++ b/NaturalDisasters.pptx
@@ -3148,7 +3148,7 @@
         <a:p>
           <a:r>
             <a:rPr lang="en-US" dirty="0"/>
-            <a:t>Data needed</a:t>
+            <a:t>Data</a:t>
           </a:r>
         </a:p>
       </dgm:t>
@@ -3675,7 +3675,7 @@
       <dgm:spPr/>
     </dgm:pt>
     <dgm:pt modelId="{45E3B86A-E5DA-4B29-BEED-858F6515DE6F}" type="pres">
-      <dgm:prSet presAssocID="{85759021-8AC6-4915-B44F-3CFEC6133EFD}" presName="bgRect" presStyleLbl="bgShp" presStyleIdx="2" presStyleCnt="3" custScaleY="284402" custLinFactNeighborY="73554"/>
+      <dgm:prSet presAssocID="{85759021-8AC6-4915-B44F-3CFEC6133EFD}" presName="bgRect" presStyleLbl="bgShp" presStyleIdx="2" presStyleCnt="3" custScaleY="284402" custLinFactNeighborX="-4387" custLinFactNeighborY="71196"/>
       <dgm:spPr/>
     </dgm:pt>
     <dgm:pt modelId="{E8369211-7CA7-43A2-867D-FA81DE4DC881}" type="pres">
@@ -3972,6 +3972,13 @@
           </a:r>
         </a:p>
       </dgm:t>
+      <dgm:extLst>
+        <a:ext uri="{E40237B7-FDA0-4F09-8148-C483321AD2D9}">
+          <dgm14:cNvPr xmlns:dgm14="http://schemas.microsoft.com/office/drawing/2010/diagram" id="0" name="">
+            <a:hlinkClick xmlns:r="http://schemas.openxmlformats.org/officeDocument/2006/relationships" r:id="rId1"/>
+          </dgm14:cNvPr>
+        </a:ext>
+      </dgm:extLst>
     </dgm:pt>
     <dgm:pt modelId="{6CBA1852-8BDE-4B0F-BA28-B78BF058579F}" type="parTrans" cxnId="{53285747-4EFD-490C-8D85-571596B8B223}">
       <dgm:prSet/>
@@ -3996,14 +4003,14 @@
       </dgm:t>
     </dgm:pt>
     <dgm:pt modelId="{86BFE1F0-23C4-4794-8ADB-59CF9038B7CF}">
-      <dgm:prSet phldrT="[Text]"/>
+      <dgm:prSet phldrT="[Text]" custT="1"/>
       <dgm:spPr/>
       <dgm:t>
         <a:bodyPr/>
         <a:lstStyle/>
         <a:p>
           <a:r>
-            <a:rPr lang="en-US" dirty="0"/>
+            <a:rPr lang="en-US" sz="2300" dirty="0"/>
             <a:t>Weather event</a:t>
           </a:r>
         </a:p>
@@ -4032,14 +4039,14 @@
       </dgm:t>
     </dgm:pt>
     <dgm:pt modelId="{F5361E89-D726-494F-A7EB-1E62F0E67686}">
-      <dgm:prSet phldrT="[Text]"/>
+      <dgm:prSet phldrT="[Text]" custT="1"/>
       <dgm:spPr/>
       <dgm:t>
         <a:bodyPr/>
         <a:lstStyle/>
         <a:p>
           <a:r>
-            <a:rPr lang="en-US" dirty="0"/>
+            <a:rPr lang="en-US" sz="2300" dirty="0"/>
             <a:t>Energy system impact(s)</a:t>
           </a:r>
         </a:p>
@@ -4068,15 +4075,15 @@
       </dgm:t>
     </dgm:pt>
     <dgm:pt modelId="{85759021-8AC6-4915-B44F-3CFEC6133EFD}">
-      <dgm:prSet phldrT="[Text]"/>
+      <dgm:prSet phldrT="[Text]" custT="1"/>
       <dgm:spPr/>
       <dgm:t>
         <a:bodyPr/>
         <a:lstStyle/>
         <a:p>
           <a:r>
-            <a:rPr lang="en-US" dirty="0"/>
-            <a:t>Data needed</a:t>
+            <a:rPr lang="en-US" sz="2300" dirty="0"/>
+            <a:t>Data</a:t>
           </a:r>
         </a:p>
       </dgm:t>
@@ -4260,6 +4267,13 @@
           </a:r>
         </a:p>
       </dgm:t>
+      <dgm:extLst>
+        <a:ext uri="{E40237B7-FDA0-4F09-8148-C483321AD2D9}">
+          <dgm14:cNvPr xmlns:dgm14="http://schemas.microsoft.com/office/drawing/2010/diagram" id="0" name="">
+            <a:hlinkClick xmlns:r="http://schemas.openxmlformats.org/officeDocument/2006/relationships" r:id="rId2"/>
+          </dgm14:cNvPr>
+        </a:ext>
+      </dgm:extLst>
     </dgm:pt>
     <dgm:pt modelId="{5DBBCB38-11FB-43BA-A8D8-93D1C37174BD}" type="parTrans" cxnId="{53D1E43F-EA0A-4B80-B9F2-CC54CA182CA1}">
       <dgm:prSet/>
@@ -4903,14 +4917,14 @@
       </dgm:t>
     </dgm:pt>
     <dgm:pt modelId="{86BFE1F0-23C4-4794-8ADB-59CF9038B7CF}">
-      <dgm:prSet phldrT="[Text]"/>
+      <dgm:prSet phldrT="[Text]" custT="1"/>
       <dgm:spPr/>
       <dgm:t>
         <a:bodyPr/>
         <a:lstStyle/>
         <a:p>
           <a:r>
-            <a:rPr lang="en-US" dirty="0"/>
+            <a:rPr lang="en-US" sz="2300" dirty="0"/>
             <a:t>Weather event</a:t>
           </a:r>
         </a:p>
@@ -5023,6 +5037,13 @@
           </a:r>
         </a:p>
       </dgm:t>
+      <dgm:extLst>
+        <a:ext uri="{E40237B7-FDA0-4F09-8148-C483321AD2D9}">
+          <dgm14:cNvPr xmlns:dgm14="http://schemas.microsoft.com/office/drawing/2010/diagram" id="0" name="">
+            <a:hlinkClick xmlns:r="http://schemas.openxmlformats.org/officeDocument/2006/relationships" r:id="rId1"/>
+          </dgm14:cNvPr>
+        </a:ext>
+      </dgm:extLst>
     </dgm:pt>
     <dgm:pt modelId="{FFE95D6D-D611-428D-95A8-1BD7978E9D73}" type="parTrans" cxnId="{15F9AC6E-D5C4-4130-992B-F2014381329E}">
       <dgm:prSet/>
@@ -5164,15 +5185,15 @@
       </dgm:t>
     </dgm:pt>
     <dgm:pt modelId="{85759021-8AC6-4915-B44F-3CFEC6133EFD}">
-      <dgm:prSet phldrT="[Text]"/>
+      <dgm:prSet phldrT="[Text]" custT="1"/>
       <dgm:spPr/>
       <dgm:t>
         <a:bodyPr/>
         <a:lstStyle/>
         <a:p>
           <a:r>
-            <a:rPr lang="en-US" dirty="0"/>
-            <a:t>Data needed</a:t>
+            <a:rPr lang="en-US" sz="2300" dirty="0"/>
+            <a:t>Data</a:t>
           </a:r>
         </a:p>
       </dgm:t>
@@ -5200,14 +5221,14 @@
       </dgm:t>
     </dgm:pt>
     <dgm:pt modelId="{F5361E89-D726-494F-A7EB-1E62F0E67686}">
-      <dgm:prSet phldrT="[Text]"/>
+      <dgm:prSet phldrT="[Text]" custT="1"/>
       <dgm:spPr/>
       <dgm:t>
         <a:bodyPr/>
         <a:lstStyle/>
         <a:p>
           <a:r>
-            <a:rPr lang="en-US" dirty="0"/>
+            <a:rPr lang="en-US" sz="2300" dirty="0"/>
             <a:t>Energy system impact(s)</a:t>
           </a:r>
         </a:p>
@@ -5322,7 +5343,7 @@
       <dgm:spPr/>
     </dgm:pt>
     <dgm:pt modelId="{B8341881-1E1C-4A3F-85EE-6217C98810E0}" type="pres">
-      <dgm:prSet presAssocID="{84526F7E-2D6E-4836-A246-44CAEEBDDB80}" presName="level2Shape" presStyleLbl="node3" presStyleIdx="1" presStyleCnt="6" custScaleX="157184" custScaleY="199812" custLinFactY="200000" custLinFactNeighborX="-5881" custLinFactNeighborY="244038"/>
+      <dgm:prSet presAssocID="{84526F7E-2D6E-4836-A246-44CAEEBDDB80}" presName="level2Shape" presStyleLbl="node3" presStyleIdx="1" presStyleCnt="6" custScaleX="157184" custScaleY="199812" custLinFactY="200000" custLinFactNeighborX="-34946" custLinFactNeighborY="244038"/>
       <dgm:spPr/>
     </dgm:pt>
     <dgm:pt modelId="{94023795-516D-422E-9401-9F0751C0021B}" type="pres">
@@ -5338,7 +5359,7 @@
       <dgm:spPr/>
     </dgm:pt>
     <dgm:pt modelId="{12D6EFA1-E9B7-4657-9935-B1D340A75847}" type="pres">
-      <dgm:prSet presAssocID="{EDD05278-1A7D-4731-A09E-93F0A04AE703}" presName="level2Shape" presStyleLbl="node3" presStyleIdx="2" presStyleCnt="6" custScaleX="179125" custScaleY="419385" custLinFactY="200000" custLinFactNeighborX="-16458" custLinFactNeighborY="243733"/>
+      <dgm:prSet presAssocID="{EDD05278-1A7D-4731-A09E-93F0A04AE703}" presName="level2Shape" presStyleLbl="node3" presStyleIdx="2" presStyleCnt="6" custScaleX="179125" custScaleY="419385" custLinFactY="200000" custLinFactNeighborX="-24528" custLinFactNeighborY="243733"/>
       <dgm:spPr/>
     </dgm:pt>
     <dgm:pt modelId="{9658D409-A6D9-4520-BF17-55E279A572CC}" type="pres">
@@ -5639,7 +5660,7 @@
       </dsp:nvSpPr>
       <dsp:spPr>
         <a:xfrm>
-          <a:off x="0" y="3652554"/>
+          <a:off x="0" y="3636650"/>
           <a:ext cx="9605818" cy="1918209"/>
         </a:xfrm>
         <a:prstGeom prst="roundRect">
@@ -5693,12 +5714,12 @@
           </a:pPr>
           <a:r>
             <a:rPr lang="en-US" sz="2300" kern="1200" dirty="0"/>
-            <a:t>Data needed</a:t>
+            <a:t>Data</a:t>
           </a:r>
         </a:p>
       </dsp:txBody>
       <dsp:txXfrm>
-        <a:off x="0" y="3652554"/>
+        <a:off x="0" y="3636650"/>
         <a:ext cx="2881745" cy="1918209"/>
       </dsp:txXfrm>
     </dsp:sp>
@@ -7374,12 +7395,12 @@
         <a:fontRef idx="minor"/>
       </dsp:style>
       <dsp:txBody>
-        <a:bodyPr spcFirstLastPara="0" vert="horz" wrap="square" lIns="113792" tIns="113792" rIns="113792" bIns="113792" numCol="1" spcCol="1270" anchor="ctr" anchorCtr="0">
+        <a:bodyPr spcFirstLastPara="0" vert="horz" wrap="square" lIns="163576" tIns="163576" rIns="163576" bIns="163576" numCol="1" spcCol="1270" anchor="ctr" anchorCtr="0">
           <a:noAutofit/>
         </a:bodyPr>
         <a:lstStyle/>
         <a:p>
-          <a:pPr marL="0" lvl="0" indent="0" algn="ctr" defTabSz="711200">
+          <a:pPr marL="0" lvl="0" indent="0" algn="ctr" defTabSz="1022350">
             <a:lnSpc>
               <a:spcPct val="90000"/>
             </a:lnSpc>
@@ -7392,8 +7413,8 @@
             <a:buNone/>
           </a:pPr>
           <a:r>
-            <a:rPr lang="en-US" sz="1600" kern="1200" dirty="0"/>
-            <a:t>Data needed</a:t>
+            <a:rPr lang="en-US" sz="2300" kern="1200" dirty="0"/>
+            <a:t>Data</a:t>
           </a:r>
         </a:p>
       </dsp:txBody>
@@ -7444,12 +7465,12 @@
         <a:fontRef idx="minor"/>
       </dsp:style>
       <dsp:txBody>
-        <a:bodyPr spcFirstLastPara="0" vert="horz" wrap="square" lIns="113792" tIns="113792" rIns="113792" bIns="113792" numCol="1" spcCol="1270" anchor="ctr" anchorCtr="0">
+        <a:bodyPr spcFirstLastPara="0" vert="horz" wrap="square" lIns="163576" tIns="163576" rIns="163576" bIns="163576" numCol="1" spcCol="1270" anchor="ctr" anchorCtr="0">
           <a:noAutofit/>
         </a:bodyPr>
         <a:lstStyle/>
         <a:p>
-          <a:pPr marL="0" lvl="0" indent="0" algn="ctr" defTabSz="711200">
+          <a:pPr marL="0" lvl="0" indent="0" algn="ctr" defTabSz="1022350">
             <a:lnSpc>
               <a:spcPct val="90000"/>
             </a:lnSpc>
@@ -7462,7 +7483,7 @@
             <a:buNone/>
           </a:pPr>
           <a:r>
-            <a:rPr lang="en-US" sz="1600" kern="1200" dirty="0"/>
+            <a:rPr lang="en-US" sz="2300" kern="1200" dirty="0"/>
             <a:t>Energy system impact(s)</a:t>
           </a:r>
         </a:p>
@@ -7514,12 +7535,12 @@
         <a:fontRef idx="minor"/>
       </dsp:style>
       <dsp:txBody>
-        <a:bodyPr spcFirstLastPara="0" vert="horz" wrap="square" lIns="113792" tIns="113792" rIns="113792" bIns="113792" numCol="1" spcCol="1270" anchor="ctr" anchorCtr="0">
+        <a:bodyPr spcFirstLastPara="0" vert="horz" wrap="square" lIns="163576" tIns="163576" rIns="163576" bIns="163576" numCol="1" spcCol="1270" anchor="ctr" anchorCtr="0">
           <a:noAutofit/>
         </a:bodyPr>
         <a:lstStyle/>
         <a:p>
-          <a:pPr marL="0" lvl="0" indent="0" algn="ctr" defTabSz="711200">
+          <a:pPr marL="0" lvl="0" indent="0" algn="ctr" defTabSz="1022350">
             <a:lnSpc>
               <a:spcPct val="90000"/>
             </a:lnSpc>
@@ -7532,7 +7553,7 @@
             <a:buNone/>
           </a:pPr>
           <a:r>
-            <a:rPr lang="en-US" sz="1600" kern="1200" dirty="0"/>
+            <a:rPr lang="en-US" sz="2300" kern="1200" dirty="0"/>
             <a:t>Weather event</a:t>
           </a:r>
         </a:p>
@@ -9086,12 +9107,12 @@
         <a:fontRef idx="minor"/>
       </dsp:style>
       <dsp:txBody>
-        <a:bodyPr spcFirstLastPara="0" vert="horz" wrap="square" lIns="99568" tIns="99568" rIns="99568" bIns="99568" numCol="1" spcCol="1270" anchor="ctr" anchorCtr="0">
+        <a:bodyPr spcFirstLastPara="0" vert="horz" wrap="square" lIns="163576" tIns="163576" rIns="163576" bIns="163576" numCol="1" spcCol="1270" anchor="ctr" anchorCtr="0">
           <a:noAutofit/>
         </a:bodyPr>
         <a:lstStyle/>
         <a:p>
-          <a:pPr marL="0" lvl="0" indent="0" algn="ctr" defTabSz="622300">
+          <a:pPr marL="0" lvl="0" indent="0" algn="ctr" defTabSz="1022350">
             <a:lnSpc>
               <a:spcPct val="90000"/>
             </a:lnSpc>
@@ -9104,8 +9125,8 @@
             <a:buNone/>
           </a:pPr>
           <a:r>
-            <a:rPr lang="en-US" sz="1400" kern="1200" dirty="0"/>
-            <a:t>Data needed</a:t>
+            <a:rPr lang="en-US" sz="2300" kern="1200" dirty="0"/>
+            <a:t>Data</a:t>
           </a:r>
         </a:p>
       </dsp:txBody>
@@ -9156,12 +9177,12 @@
         <a:fontRef idx="minor"/>
       </dsp:style>
       <dsp:txBody>
-        <a:bodyPr spcFirstLastPara="0" vert="horz" wrap="square" lIns="99568" tIns="99568" rIns="99568" bIns="99568" numCol="1" spcCol="1270" anchor="ctr" anchorCtr="0">
+        <a:bodyPr spcFirstLastPara="0" vert="horz" wrap="square" lIns="163576" tIns="163576" rIns="163576" bIns="163576" numCol="1" spcCol="1270" anchor="ctr" anchorCtr="0">
           <a:noAutofit/>
         </a:bodyPr>
         <a:lstStyle/>
         <a:p>
-          <a:pPr marL="0" lvl="0" indent="0" algn="ctr" defTabSz="622300">
+          <a:pPr marL="0" lvl="0" indent="0" algn="ctr" defTabSz="1022350">
             <a:lnSpc>
               <a:spcPct val="90000"/>
             </a:lnSpc>
@@ -9174,7 +9195,7 @@
             <a:buNone/>
           </a:pPr>
           <a:r>
-            <a:rPr lang="en-US" sz="1400" kern="1200" dirty="0"/>
+            <a:rPr lang="en-US" sz="2300" kern="1200" dirty="0"/>
             <a:t>Energy system impact(s)</a:t>
           </a:r>
         </a:p>
@@ -9226,12 +9247,12 @@
         <a:fontRef idx="minor"/>
       </dsp:style>
       <dsp:txBody>
-        <a:bodyPr spcFirstLastPara="0" vert="horz" wrap="square" lIns="99568" tIns="99568" rIns="99568" bIns="99568" numCol="1" spcCol="1270" anchor="ctr" anchorCtr="0">
+        <a:bodyPr spcFirstLastPara="0" vert="horz" wrap="square" lIns="163576" tIns="163576" rIns="163576" bIns="163576" numCol="1" spcCol="1270" anchor="ctr" anchorCtr="0">
           <a:noAutofit/>
         </a:bodyPr>
         <a:lstStyle/>
         <a:p>
-          <a:pPr marL="0" lvl="0" indent="0" algn="ctr" defTabSz="622300">
+          <a:pPr marL="0" lvl="0" indent="0" algn="ctr" defTabSz="1022350">
             <a:lnSpc>
               <a:spcPct val="90000"/>
             </a:lnSpc>
@@ -9244,7 +9265,7 @@
             <a:buNone/>
           </a:pPr>
           <a:r>
-            <a:rPr lang="en-US" sz="1400" kern="1200" dirty="0"/>
+            <a:rPr lang="en-US" sz="2300" kern="1200" dirty="0"/>
             <a:t>Weather event</a:t>
           </a:r>
         </a:p>
@@ -9623,8 +9644,8 @@
       </dsp:nvSpPr>
       <dsp:spPr>
         <a:xfrm>
-          <a:off x="4280539" y="2620886"/>
-          <a:ext cx="91440" cy="1426757"/>
+          <a:off x="4183118" y="2620886"/>
+          <a:ext cx="154798" cy="1426757"/>
         </a:xfrm>
         <a:custGeom>
           <a:avLst/>
@@ -9635,16 +9656,16 @@
           <a:pathLst>
             <a:path>
               <a:moveTo>
-                <a:pt x="57377" y="0"/>
+                <a:pt x="154798" y="0"/>
               </a:moveTo>
               <a:lnTo>
-                <a:pt x="57377" y="713378"/>
+                <a:pt x="154798" y="713378"/>
               </a:lnTo>
               <a:lnTo>
-                <a:pt x="45720" y="713378"/>
+                <a:pt x="0" y="713378"/>
               </a:lnTo>
               <a:lnTo>
-                <a:pt x="45720" y="1426757"/>
+                <a:pt x="0" y="1426757"/>
               </a:lnTo>
             </a:path>
           </a:pathLst>
@@ -9684,7 +9705,7 @@
       </dsp:nvSpPr>
       <dsp:spPr>
         <a:xfrm>
-          <a:off x="3939205" y="4047643"/>
+          <a:off x="3796064" y="4047643"/>
           <a:ext cx="774108" cy="656030"/>
         </a:xfrm>
         <a:prstGeom prst="roundRect">
@@ -9753,7 +9774,7 @@
         </a:p>
       </dsp:txBody>
       <dsp:txXfrm>
-        <a:off x="3958419" y="4066857"/>
+        <a:off x="3815278" y="4066857"/>
         <a:ext cx="735680" cy="617602"/>
       </dsp:txXfrm>
     </dsp:sp>
@@ -9765,7 +9786,7 @@
       <dsp:spPr>
         <a:xfrm>
           <a:off x="4337917" y="2620886"/>
-          <a:ext cx="912135" cy="1425756"/>
+          <a:ext cx="872391" cy="1425756"/>
         </a:xfrm>
         <a:custGeom>
           <a:avLst/>
@@ -9782,10 +9803,10 @@
                 <a:pt x="0" y="712878"/>
               </a:lnTo>
               <a:lnTo>
-                <a:pt x="912135" y="712878"/>
+                <a:pt x="872391" y="712878"/>
               </a:lnTo>
               <a:lnTo>
-                <a:pt x="912135" y="1425756"/>
+                <a:pt x="872391" y="1425756"/>
               </a:lnTo>
             </a:path>
           </a:pathLst>
@@ -9825,7 +9846,7 @@
       </dsp:nvSpPr>
       <dsp:spPr>
         <a:xfrm>
-          <a:off x="4808969" y="4046642"/>
+          <a:off x="4769226" y="4046642"/>
           <a:ext cx="882165" cy="1376941"/>
         </a:xfrm>
         <a:prstGeom prst="roundRect">
@@ -9894,7 +9915,7 @@
         </a:p>
       </dsp:txBody>
       <dsp:txXfrm>
-        <a:off x="4834807" y="4072480"/>
+        <a:off x="4795064" y="4072480"/>
         <a:ext cx="830489" cy="1325265"/>
       </dsp:txXfrm>
     </dsp:sp>
@@ -17052,7 +17073,7 @@
           <a:p>
             <a:fld id="{8F72BA41-EC5B-4197-BCC8-0FD2E523CD7A}" type="datetimeFigureOut">
               <a:rPr lang="en-US" smtClean="0"/>
-              <a:t>2/2/2022</a:t>
+              <a:t>2/3/2022</a:t>
             </a:fld>
             <a:endParaRPr lang="en-US"/>
           </a:p>
@@ -17255,7 +17276,7 @@
           <a:p>
             <a:fld id="{8F72BA41-EC5B-4197-BCC8-0FD2E523CD7A}" type="datetimeFigureOut">
               <a:rPr lang="en-US" smtClean="0"/>
-              <a:t>2/2/2022</a:t>
+              <a:t>2/3/2022</a:t>
             </a:fld>
             <a:endParaRPr lang="en-US"/>
           </a:p>
@@ -18976,7 +18997,7 @@
           <a:p>
             <a:fld id="{8F72BA41-EC5B-4197-BCC8-0FD2E523CD7A}" type="datetimeFigureOut">
               <a:rPr lang="en-US" smtClean="0"/>
-              <a:t>2/2/2022</a:t>
+              <a:t>2/3/2022</a:t>
             </a:fld>
             <a:endParaRPr lang="en-US"/>
           </a:p>
@@ -19175,7 +19196,7 @@
           <a:p>
             <a:fld id="{8F72BA41-EC5B-4197-BCC8-0FD2E523CD7A}" type="datetimeFigureOut">
               <a:rPr lang="en-US" smtClean="0"/>
-              <a:t>2/2/2022</a:t>
+              <a:t>2/3/2022</a:t>
             </a:fld>
             <a:endParaRPr lang="en-US"/>
           </a:p>
@@ -20965,7 +20986,7 @@
           <a:p>
             <a:fld id="{8F72BA41-EC5B-4197-BCC8-0FD2E523CD7A}" type="datetimeFigureOut">
               <a:rPr lang="en-US" smtClean="0"/>
-              <a:t>2/2/2022</a:t>
+              <a:t>2/3/2022</a:t>
             </a:fld>
             <a:endParaRPr lang="en-US"/>
           </a:p>
@@ -21238,7 +21259,7 @@
           <a:p>
             <a:fld id="{8F72BA41-EC5B-4197-BCC8-0FD2E523CD7A}" type="datetimeFigureOut">
               <a:rPr lang="en-US" smtClean="0"/>
-              <a:t>2/2/2022</a:t>
+              <a:t>2/3/2022</a:t>
             </a:fld>
             <a:endParaRPr lang="en-US"/>
           </a:p>
@@ -21658,7 +21679,7 @@
           <a:p>
             <a:fld id="{8F72BA41-EC5B-4197-BCC8-0FD2E523CD7A}" type="datetimeFigureOut">
               <a:rPr lang="en-US" smtClean="0"/>
-              <a:t>2/2/2022</a:t>
+              <a:t>2/3/2022</a:t>
             </a:fld>
             <a:endParaRPr lang="en-US"/>
           </a:p>
@@ -21814,7 +21835,7 @@
           <a:p>
             <a:fld id="{8F72BA41-EC5B-4197-BCC8-0FD2E523CD7A}" type="datetimeFigureOut">
               <a:rPr lang="en-US" smtClean="0"/>
-              <a:t>2/2/2022</a:t>
+              <a:t>2/3/2022</a:t>
             </a:fld>
             <a:endParaRPr lang="en-US"/>
           </a:p>
@@ -23382,7 +23403,7 @@
           <a:p>
             <a:fld id="{8F72BA41-EC5B-4197-BCC8-0FD2E523CD7A}" type="datetimeFigureOut">
               <a:rPr lang="en-US" smtClean="0"/>
-              <a:t>2/2/2022</a:t>
+              <a:t>2/3/2022</a:t>
             </a:fld>
             <a:endParaRPr lang="en-US"/>
           </a:p>
@@ -25233,7 +25254,7 @@
           <a:p>
             <a:fld id="{8F72BA41-EC5B-4197-BCC8-0FD2E523CD7A}" type="datetimeFigureOut">
               <a:rPr lang="en-US" smtClean="0"/>
-              <a:t>2/2/2022</a:t>
+              <a:t>2/3/2022</a:t>
             </a:fld>
             <a:endParaRPr lang="en-US"/>
           </a:p>
@@ -27046,7 +27067,7 @@
           <a:p>
             <a:fld id="{8F72BA41-EC5B-4197-BCC8-0FD2E523CD7A}" type="datetimeFigureOut">
               <a:rPr lang="en-US" smtClean="0"/>
-              <a:t>2/2/2022</a:t>
+              <a:t>2/3/2022</a:t>
             </a:fld>
             <a:endParaRPr lang="en-US"/>
           </a:p>
@@ -28740,7 +28761,7 @@
             <a:fld id="{8F72BA41-EC5B-4197-BCC8-0FD2E523CD7A}" type="datetimeFigureOut">
               <a:rPr lang="en-US" smtClean="0"/>
               <a:pPr/>
-              <a:t>2/2/2022</a:t>
+              <a:t>2/3/2022</a:t>
             </a:fld>
             <a:endParaRPr lang="en-US" dirty="0"/>
           </a:p>
@@ -31330,7 +31351,7 @@
           <p:nvPr>
             <p:extLst>
               <p:ext uri="{D42A27DB-BD31-4B8C-83A1-F6EECF244321}">
-                <p14:modId xmlns:p14="http://schemas.microsoft.com/office/powerpoint/2010/main" val="3762446045"/>
+                <p14:modId xmlns:p14="http://schemas.microsoft.com/office/powerpoint/2010/main" val="3379303354"/>
               </p:ext>
             </p:extLst>
           </p:nvPr>
@@ -31521,7 +31542,7 @@
           <p:nvPr>
             <p:extLst>
               <p:ext uri="{D42A27DB-BD31-4B8C-83A1-F6EECF244321}">
-                <p14:modId xmlns:p14="http://schemas.microsoft.com/office/powerpoint/2010/main" val="4123566697"/>
+                <p14:modId xmlns:p14="http://schemas.microsoft.com/office/powerpoint/2010/main" val="1639361604"/>
               </p:ext>
             </p:extLst>
           </p:nvPr>
@@ -31579,7 +31600,7 @@
           <p:nvPr>
             <p:extLst>
               <p:ext uri="{D42A27DB-BD31-4B8C-83A1-F6EECF244321}">
-                <p14:modId xmlns:p14="http://schemas.microsoft.com/office/powerpoint/2010/main" val="3080200099"/>
+                <p14:modId xmlns:p14="http://schemas.microsoft.com/office/powerpoint/2010/main" val="726905235"/>
               </p:ext>
             </p:extLst>
           </p:nvPr>

</xml_diff>